<commit_message>
Update Webová aplikace časopisu.pptx
</commit_message>
<xml_diff>
--- a/documents/Webová aplikace časopisu.pptx
+++ b/documents/Webová aplikace časopisu.pptx
@@ -18,6 +18,10 @@
     <p:sldId id="266" r:id="rId12"/>
     <p:sldId id="267" r:id="rId13"/>
     <p:sldId id="268" r:id="rId14"/>
+    <p:sldId id="269" r:id="rId15"/>
+    <p:sldId id="270" r:id="rId16"/>
+    <p:sldId id="271" r:id="rId17"/>
+    <p:sldId id="272" r:id="rId18"/>
   </p:sldIdLst>
   <p:sldSz cx="12192000" cy="6858000"/>
   <p:notesSz cx="6858000" cy="9144000"/>
@@ -134,9 +138,16 @@
             <p14:sldId id="266"/>
             <p14:sldId id="267"/>
             <p14:sldId id="268"/>
+            <p14:sldId id="269"/>
+            <p14:sldId id="270"/>
+            <p14:sldId id="271"/>
+            <p14:sldId id="272"/>
           </p14:sldIdLst>
         </p14:section>
       </p14:sectionLst>
+    </p:ext>
+    <p:ext uri="{EFAFB233-063F-42B5-8137-9DF3F51BA10A}">
+      <p15:sldGuideLst xmlns:p15="http://schemas.microsoft.com/office/powerpoint/2012/main"/>
     </p:ext>
   </p:extLst>
 </p:presentation>
@@ -356,7 +367,7 @@
             <a:fld id="{B61BEF0D-F0BB-DE4B-95CE-6DB70DBA9567}" type="datetimeFigureOut">
               <a:rPr lang="en-US" dirty="0"/>
               <a:pPr/>
-              <a:t>11/20/2019</a:t>
+              <a:t>11/29/2019</a:t>
             </a:fld>
             <a:endParaRPr lang="en-US" dirty="0"/>
           </a:p>
@@ -644,7 +655,7 @@
             <a:fld id="{B61BEF0D-F0BB-DE4B-95CE-6DB70DBA9567}" type="datetimeFigureOut">
               <a:rPr lang="en-US" dirty="0"/>
               <a:pPr/>
-              <a:t>11/20/2019</a:t>
+              <a:t>11/29/2019</a:t>
             </a:fld>
             <a:endParaRPr lang="en-US" dirty="0"/>
           </a:p>
@@ -900,7 +911,7 @@
             <a:fld id="{B61BEF0D-F0BB-DE4B-95CE-6DB70DBA9567}" type="datetimeFigureOut">
               <a:rPr lang="en-US" dirty="0"/>
               <a:pPr/>
-              <a:t>11/20/2019</a:t>
+              <a:t>11/29/2019</a:t>
             </a:fld>
             <a:endParaRPr lang="en-US" dirty="0"/>
           </a:p>
@@ -1366,7 +1377,7 @@
             <a:fld id="{B61BEF0D-F0BB-DE4B-95CE-6DB70DBA9567}" type="datetimeFigureOut">
               <a:rPr lang="en-US" dirty="0"/>
               <a:pPr/>
-              <a:t>11/20/2019</a:t>
+              <a:t>11/29/2019</a:t>
             </a:fld>
             <a:endParaRPr lang="en-US" dirty="0"/>
           </a:p>
@@ -1543,7 +1554,7 @@
             <a:fld id="{B61BEF0D-F0BB-DE4B-95CE-6DB70DBA9567}" type="datetimeFigureOut">
               <a:rPr lang="en-US" dirty="0"/>
               <a:pPr/>
-              <a:t>11/20/2019</a:t>
+              <a:t>11/29/2019</a:t>
             </a:fld>
             <a:endParaRPr lang="en-US" dirty="0"/>
           </a:p>
@@ -2116,7 +2127,7 @@
             <a:fld id="{B61BEF0D-F0BB-DE4B-95CE-6DB70DBA9567}" type="datetimeFigureOut">
               <a:rPr lang="en-US" dirty="0"/>
               <a:pPr/>
-              <a:t>11/20/2019</a:t>
+              <a:t>11/29/2019</a:t>
             </a:fld>
             <a:endParaRPr lang="en-US" dirty="0"/>
           </a:p>
@@ -2445,7 +2456,7 @@
             <a:fld id="{B61BEF0D-F0BB-DE4B-95CE-6DB70DBA9567}" type="datetimeFigureOut">
               <a:rPr lang="en-US" dirty="0"/>
               <a:pPr/>
-              <a:t>11/20/2019</a:t>
+              <a:t>11/29/2019</a:t>
             </a:fld>
             <a:endParaRPr lang="en-US" dirty="0"/>
           </a:p>
@@ -2617,7 +2628,7 @@
             <a:fld id="{B61BEF0D-F0BB-DE4B-95CE-6DB70DBA9567}" type="datetimeFigureOut">
               <a:rPr lang="en-US" dirty="0"/>
               <a:pPr/>
-              <a:t>11/20/2019</a:t>
+              <a:t>11/29/2019</a:t>
             </a:fld>
             <a:endParaRPr lang="en-US" dirty="0"/>
           </a:p>
@@ -2794,7 +2805,7 @@
             <a:fld id="{B61BEF0D-F0BB-DE4B-95CE-6DB70DBA9567}" type="datetimeFigureOut">
               <a:rPr lang="en-US" dirty="0"/>
               <a:pPr/>
-              <a:t>11/20/2019</a:t>
+              <a:t>11/29/2019</a:t>
             </a:fld>
             <a:endParaRPr lang="en-US" dirty="0"/>
           </a:p>
@@ -2961,7 +2972,7 @@
             <a:fld id="{B61BEF0D-F0BB-DE4B-95CE-6DB70DBA9567}" type="datetimeFigureOut">
               <a:rPr lang="en-US" dirty="0"/>
               <a:pPr/>
-              <a:t>11/20/2019</a:t>
+              <a:t>11/29/2019</a:t>
             </a:fld>
             <a:endParaRPr lang="en-US" dirty="0"/>
           </a:p>
@@ -3215,7 +3226,7 @@
             <a:fld id="{B61BEF0D-F0BB-DE4B-95CE-6DB70DBA9567}" type="datetimeFigureOut">
               <a:rPr lang="en-US" dirty="0"/>
               <a:pPr/>
-              <a:t>11/20/2019</a:t>
+              <a:t>11/29/2019</a:t>
             </a:fld>
             <a:endParaRPr lang="en-US" dirty="0"/>
           </a:p>
@@ -3504,7 +3515,7 @@
             <a:fld id="{B61BEF0D-F0BB-DE4B-95CE-6DB70DBA9567}" type="datetimeFigureOut">
               <a:rPr lang="en-US" dirty="0"/>
               <a:pPr/>
-              <a:t>11/20/2019</a:t>
+              <a:t>11/29/2019</a:t>
             </a:fld>
             <a:endParaRPr lang="en-US" dirty="0"/>
           </a:p>
@@ -3931,7 +3942,7 @@
             <a:fld id="{B61BEF0D-F0BB-DE4B-95CE-6DB70DBA9567}" type="datetimeFigureOut">
               <a:rPr lang="en-US" dirty="0"/>
               <a:pPr/>
-              <a:t>11/20/2019</a:t>
+              <a:t>11/29/2019</a:t>
             </a:fld>
             <a:endParaRPr lang="en-US" dirty="0"/>
           </a:p>
@@ -4046,7 +4057,7 @@
             <a:fld id="{B61BEF0D-F0BB-DE4B-95CE-6DB70DBA9567}" type="datetimeFigureOut">
               <a:rPr lang="en-US" dirty="0"/>
               <a:pPr/>
-              <a:t>11/20/2019</a:t>
+              <a:t>11/29/2019</a:t>
             </a:fld>
             <a:endParaRPr lang="en-US" dirty="0"/>
           </a:p>
@@ -4138,7 +4149,7 @@
             <a:fld id="{B61BEF0D-F0BB-DE4B-95CE-6DB70DBA9567}" type="datetimeFigureOut">
               <a:rPr lang="en-US" dirty="0"/>
               <a:pPr/>
-              <a:t>11/20/2019</a:t>
+              <a:t>11/29/2019</a:t>
             </a:fld>
             <a:endParaRPr lang="en-US" dirty="0"/>
           </a:p>
@@ -4418,7 +4429,7 @@
             <a:fld id="{B61BEF0D-F0BB-DE4B-95CE-6DB70DBA9567}" type="datetimeFigureOut">
               <a:rPr lang="en-US" dirty="0"/>
               <a:pPr/>
-              <a:t>11/20/2019</a:t>
+              <a:t>11/29/2019</a:t>
             </a:fld>
             <a:endParaRPr lang="en-US" dirty="0"/>
           </a:p>
@@ -4706,7 +4717,7 @@
             <a:fld id="{B61BEF0D-F0BB-DE4B-95CE-6DB70DBA9567}" type="datetimeFigureOut">
               <a:rPr lang="en-US" dirty="0"/>
               <a:pPr/>
-              <a:t>11/20/2019</a:t>
+              <a:t>11/29/2019</a:t>
             </a:fld>
             <a:endParaRPr lang="en-US" dirty="0"/>
           </a:p>
@@ -4934,7 +4945,7 @@
             <a:fld id="{B61BEF0D-F0BB-DE4B-95CE-6DB70DBA9567}" type="datetimeFigureOut">
               <a:rPr lang="en-US" dirty="0"/>
               <a:pPr/>
-              <a:t>11/20/2019</a:t>
+              <a:t>11/29/2019</a:t>
             </a:fld>
             <a:endParaRPr lang="en-US" dirty="0"/>
           </a:p>
@@ -6367,9 +6378,16 @@
             <p:ph type="title"/>
           </p:nvPr>
         </p:nvSpPr>
-        <p:spPr/>
-        <p:txBody>
-          <a:bodyPr/>
+        <p:spPr>
+          <a:xfrm>
+            <a:off x="206059" y="2702767"/>
+            <a:ext cx="4242351" cy="1076131"/>
+          </a:xfrm>
+        </p:spPr>
+        <p:txBody>
+          <a:bodyPr>
+            <a:normAutofit/>
+          </a:bodyPr>
           <a:lstStyle/>
           <a:p>
             <a:r>
@@ -6387,35 +6405,609 @@
           </a:p>
         </p:txBody>
       </p:sp>
-      <p:sp>
-        <p:nvSpPr>
-          <p:cNvPr id="3" name="Zástupný obsah 2">
+      <p:pic>
+        <p:nvPicPr>
+          <p:cNvPr id="4" name="Obrázek 3">
             <a:extLst>
               <a:ext uri="{FF2B5EF4-FFF2-40B4-BE49-F238E27FC236}">
-                <a16:creationId xmlns:a16="http://schemas.microsoft.com/office/drawing/2014/main" id="{3B70ECD4-1A77-4B53-9E4F-B5456B63DF53}"/>
+                <a16:creationId xmlns:a16="http://schemas.microsoft.com/office/drawing/2014/main" id="{2134DC76-91C7-4051-8C79-F13267866817}"/>
               </a:ext>
             </a:extLst>
           </p:cNvPr>
-          <p:cNvSpPr>
-            <a:spLocks noGrp="1"/>
-          </p:cNvSpPr>
-          <p:nvPr>
-            <p:ph idx="1"/>
-          </p:nvPr>
-        </p:nvSpPr>
-        <p:spPr/>
-        <p:txBody>
-          <a:bodyPr/>
-          <a:lstStyle/>
-          <a:p>
-            <a:endParaRPr lang="cs-CZ"/>
-          </a:p>
-        </p:txBody>
-      </p:sp>
+          <p:cNvPicPr>
+            <a:picLocks noChangeAspect="1"/>
+          </p:cNvPicPr>
+          <p:nvPr/>
+        </p:nvPicPr>
+        <p:blipFill>
+          <a:blip r:embed="rId2"/>
+          <a:stretch>
+            <a:fillRect/>
+          </a:stretch>
+        </p:blipFill>
+        <p:spPr>
+          <a:xfrm>
+            <a:off x="8430224" y="0"/>
+            <a:ext cx="3714750" cy="6800850"/>
+          </a:xfrm>
+          <a:prstGeom prst="rect">
+            <a:avLst/>
+          </a:prstGeom>
+        </p:spPr>
+      </p:pic>
+      <p:pic>
+        <p:nvPicPr>
+          <p:cNvPr id="8" name="Obrázek 7">
+            <a:extLst>
+              <a:ext uri="{FF2B5EF4-FFF2-40B4-BE49-F238E27FC236}">
+                <a16:creationId xmlns:a16="http://schemas.microsoft.com/office/drawing/2014/main" id="{B63D86F8-EF20-42A3-8D97-039717707BEA}"/>
+              </a:ext>
+            </a:extLst>
+          </p:cNvPr>
+          <p:cNvPicPr>
+            <a:picLocks noChangeAspect="1"/>
+          </p:cNvPicPr>
+          <p:nvPr/>
+        </p:nvPicPr>
+        <p:blipFill>
+          <a:blip r:embed="rId3"/>
+          <a:stretch>
+            <a:fillRect/>
+          </a:stretch>
+        </p:blipFill>
+        <p:spPr>
+          <a:xfrm>
+            <a:off x="4708946" y="0"/>
+            <a:ext cx="3800475" cy="6858000"/>
+          </a:xfrm>
+          <a:prstGeom prst="rect">
+            <a:avLst/>
+          </a:prstGeom>
+        </p:spPr>
+      </p:pic>
     </p:spTree>
     <p:extLst>
       <p:ext uri="{BB962C8B-B14F-4D97-AF65-F5344CB8AC3E}">
         <p14:creationId xmlns:p14="http://schemas.microsoft.com/office/powerpoint/2010/main" val="2285096435"/>
+      </p:ext>
+    </p:extLst>
+  </p:cSld>
+  <p:clrMapOvr>
+    <a:masterClrMapping/>
+  </p:clrMapOvr>
+</p:sld>
+</file>
+
+<file path=ppt/slides/slide14.xml><?xml version="1.0" encoding="utf-8"?>
+<p:sld xmlns:a="http://schemas.openxmlformats.org/drawingml/2006/main" xmlns:r="http://schemas.openxmlformats.org/officeDocument/2006/relationships" xmlns:p="http://schemas.openxmlformats.org/presentationml/2006/main">
+  <p:cSld>
+    <p:spTree>
+      <p:nvGrpSpPr>
+        <p:cNvPr id="1" name=""/>
+        <p:cNvGrpSpPr/>
+        <p:nvPr/>
+      </p:nvGrpSpPr>
+      <p:grpSpPr>
+        <a:xfrm>
+          <a:off x="0" y="0"/>
+          <a:ext cx="0" cy="0"/>
+          <a:chOff x="0" y="0"/>
+          <a:chExt cx="0" cy="0"/>
+        </a:xfrm>
+      </p:grpSpPr>
+      <p:pic>
+        <p:nvPicPr>
+          <p:cNvPr id="4" name="Obrázek 3">
+            <a:extLst>
+              <a:ext uri="{FF2B5EF4-FFF2-40B4-BE49-F238E27FC236}">
+                <a16:creationId xmlns:a16="http://schemas.microsoft.com/office/drawing/2014/main" id="{759C02FD-D19E-4AC0-9805-AB6A15996C44}"/>
+              </a:ext>
+            </a:extLst>
+          </p:cNvPr>
+          <p:cNvPicPr>
+            <a:picLocks noChangeAspect="1"/>
+          </p:cNvPicPr>
+          <p:nvPr/>
+        </p:nvPicPr>
+        <p:blipFill>
+          <a:blip r:embed="rId2"/>
+          <a:stretch>
+            <a:fillRect/>
+          </a:stretch>
+        </p:blipFill>
+        <p:spPr>
+          <a:xfrm>
+            <a:off x="539659" y="344367"/>
+            <a:ext cx="6279424" cy="3865199"/>
+          </a:xfrm>
+          <a:prstGeom prst="rect">
+            <a:avLst/>
+          </a:prstGeom>
+        </p:spPr>
+      </p:pic>
+      <p:pic>
+        <p:nvPicPr>
+          <p:cNvPr id="5" name="Obrázek 4">
+            <a:extLst>
+              <a:ext uri="{FF2B5EF4-FFF2-40B4-BE49-F238E27FC236}">
+                <a16:creationId xmlns:a16="http://schemas.microsoft.com/office/drawing/2014/main" id="{0284E853-7734-45EB-91F2-2A94009CF49E}"/>
+              </a:ext>
+            </a:extLst>
+          </p:cNvPr>
+          <p:cNvPicPr>
+            <a:picLocks noChangeAspect="1"/>
+          </p:cNvPicPr>
+          <p:nvPr/>
+        </p:nvPicPr>
+        <p:blipFill>
+          <a:blip r:embed="rId3"/>
+          <a:stretch>
+            <a:fillRect/>
+          </a:stretch>
+        </p:blipFill>
+        <p:spPr>
+          <a:xfrm>
+            <a:off x="4484113" y="4454865"/>
+            <a:ext cx="2334970" cy="2152075"/>
+          </a:xfrm>
+          <a:prstGeom prst="rect">
+            <a:avLst/>
+          </a:prstGeom>
+        </p:spPr>
+      </p:pic>
+      <p:pic>
+        <p:nvPicPr>
+          <p:cNvPr id="6" name="Obrázek 5">
+            <a:extLst>
+              <a:ext uri="{FF2B5EF4-FFF2-40B4-BE49-F238E27FC236}">
+                <a16:creationId xmlns:a16="http://schemas.microsoft.com/office/drawing/2014/main" id="{20C75637-74F5-48B2-8883-17CECC4CF3A4}"/>
+              </a:ext>
+            </a:extLst>
+          </p:cNvPr>
+          <p:cNvPicPr>
+            <a:picLocks noChangeAspect="1"/>
+          </p:cNvPicPr>
+          <p:nvPr/>
+        </p:nvPicPr>
+        <p:blipFill>
+          <a:blip r:embed="rId4"/>
+          <a:stretch>
+            <a:fillRect/>
+          </a:stretch>
+        </p:blipFill>
+        <p:spPr>
+          <a:xfrm>
+            <a:off x="7082877" y="344367"/>
+            <a:ext cx="4754978" cy="3865199"/>
+          </a:xfrm>
+          <a:prstGeom prst="rect">
+            <a:avLst/>
+          </a:prstGeom>
+        </p:spPr>
+      </p:pic>
+    </p:spTree>
+    <p:extLst>
+      <p:ext uri="{BB962C8B-B14F-4D97-AF65-F5344CB8AC3E}">
+        <p14:creationId xmlns:p14="http://schemas.microsoft.com/office/powerpoint/2010/main" val="2191244028"/>
+      </p:ext>
+    </p:extLst>
+  </p:cSld>
+  <p:clrMapOvr>
+    <a:masterClrMapping/>
+  </p:clrMapOvr>
+</p:sld>
+</file>
+
+<file path=ppt/slides/slide15.xml><?xml version="1.0" encoding="utf-8"?>
+<p:sld xmlns:a="http://schemas.openxmlformats.org/drawingml/2006/main" xmlns:r="http://schemas.openxmlformats.org/officeDocument/2006/relationships" xmlns:p="http://schemas.openxmlformats.org/presentationml/2006/main">
+  <p:cSld>
+    <p:spTree>
+      <p:nvGrpSpPr>
+        <p:cNvPr id="1" name=""/>
+        <p:cNvGrpSpPr/>
+        <p:nvPr/>
+      </p:nvGrpSpPr>
+      <p:grpSpPr>
+        <a:xfrm>
+          <a:off x="0" y="0"/>
+          <a:ext cx="0" cy="0"/>
+          <a:chOff x="0" y="0"/>
+          <a:chExt cx="0" cy="0"/>
+        </a:xfrm>
+      </p:grpSpPr>
+      <p:sp>
+        <p:nvSpPr>
+          <p:cNvPr id="2" name="Nadpis 1">
+            <a:extLst>
+              <a:ext uri="{FF2B5EF4-FFF2-40B4-BE49-F238E27FC236}">
+                <a16:creationId xmlns:a16="http://schemas.microsoft.com/office/drawing/2014/main" id="{792D3CCF-0115-473D-B6FA-22344A973973}"/>
+              </a:ext>
+            </a:extLst>
+          </p:cNvPr>
+          <p:cNvSpPr>
+            <a:spLocks noGrp="1"/>
+          </p:cNvSpPr>
+          <p:nvPr>
+            <p:ph type="title"/>
+          </p:nvPr>
+        </p:nvSpPr>
+        <p:spPr>
+          <a:xfrm>
+            <a:off x="245675" y="0"/>
+            <a:ext cx="9905998" cy="1905000"/>
+          </a:xfrm>
+        </p:spPr>
+        <p:txBody>
+          <a:bodyPr/>
+          <a:lstStyle/>
+          <a:p>
+            <a:r>
+              <a:rPr lang="cs-CZ" dirty="0"/>
+              <a:t>Příklad US a </a:t>
+            </a:r>
+            <a:r>
+              <a:rPr lang="cs-CZ" dirty="0" err="1"/>
+              <a:t>tasks</a:t>
+            </a:r>
+            <a:endParaRPr lang="cs-CZ" dirty="0"/>
+          </a:p>
+        </p:txBody>
+      </p:sp>
+      <p:pic>
+        <p:nvPicPr>
+          <p:cNvPr id="4" name="Obrázek 3">
+            <a:extLst>
+              <a:ext uri="{FF2B5EF4-FFF2-40B4-BE49-F238E27FC236}">
+                <a16:creationId xmlns:a16="http://schemas.microsoft.com/office/drawing/2014/main" id="{FC7C6B44-BBA8-4A54-9FF5-9EA014C1F545}"/>
+              </a:ext>
+            </a:extLst>
+          </p:cNvPr>
+          <p:cNvPicPr>
+            <a:picLocks noChangeAspect="1"/>
+          </p:cNvPicPr>
+          <p:nvPr/>
+        </p:nvPicPr>
+        <p:blipFill>
+          <a:blip r:embed="rId2"/>
+          <a:stretch>
+            <a:fillRect/>
+          </a:stretch>
+        </p:blipFill>
+        <p:spPr>
+          <a:xfrm>
+            <a:off x="8836091" y="0"/>
+            <a:ext cx="3355910" cy="6855498"/>
+          </a:xfrm>
+          <a:prstGeom prst="rect">
+            <a:avLst/>
+          </a:prstGeom>
+        </p:spPr>
+      </p:pic>
+      <p:pic>
+        <p:nvPicPr>
+          <p:cNvPr id="6" name="Obrázek 5">
+            <a:extLst>
+              <a:ext uri="{FF2B5EF4-FFF2-40B4-BE49-F238E27FC236}">
+                <a16:creationId xmlns:a16="http://schemas.microsoft.com/office/drawing/2014/main" id="{DDA4A3E7-23A9-40F3-A4F0-5D43741C5B93}"/>
+              </a:ext>
+            </a:extLst>
+          </p:cNvPr>
+          <p:cNvPicPr>
+            <a:picLocks noChangeAspect="1"/>
+          </p:cNvPicPr>
+          <p:nvPr/>
+        </p:nvPicPr>
+        <p:blipFill>
+          <a:blip r:embed="rId3"/>
+          <a:stretch>
+            <a:fillRect/>
+          </a:stretch>
+        </p:blipFill>
+        <p:spPr>
+          <a:xfrm>
+            <a:off x="127130" y="1250010"/>
+            <a:ext cx="4305300" cy="5514975"/>
+          </a:xfrm>
+          <a:prstGeom prst="rect">
+            <a:avLst/>
+          </a:prstGeom>
+        </p:spPr>
+      </p:pic>
+      <p:pic>
+        <p:nvPicPr>
+          <p:cNvPr id="7" name="Obrázek 6">
+            <a:extLst>
+              <a:ext uri="{FF2B5EF4-FFF2-40B4-BE49-F238E27FC236}">
+                <a16:creationId xmlns:a16="http://schemas.microsoft.com/office/drawing/2014/main" id="{169FD14C-991B-4D4D-97CB-006E33A33D93}"/>
+              </a:ext>
+            </a:extLst>
+          </p:cNvPr>
+          <p:cNvPicPr>
+            <a:picLocks noChangeAspect="1"/>
+          </p:cNvPicPr>
+          <p:nvPr/>
+        </p:nvPicPr>
+        <p:blipFill>
+          <a:blip r:embed="rId4"/>
+          <a:stretch>
+            <a:fillRect/>
+          </a:stretch>
+        </p:blipFill>
+        <p:spPr>
+          <a:xfrm>
+            <a:off x="4513491" y="251161"/>
+            <a:ext cx="4171950" cy="6353175"/>
+          </a:xfrm>
+          <a:prstGeom prst="rect">
+            <a:avLst/>
+          </a:prstGeom>
+        </p:spPr>
+      </p:pic>
+    </p:spTree>
+    <p:extLst>
+      <p:ext uri="{BB962C8B-B14F-4D97-AF65-F5344CB8AC3E}">
+        <p14:creationId xmlns:p14="http://schemas.microsoft.com/office/powerpoint/2010/main" val="2086988699"/>
+      </p:ext>
+    </p:extLst>
+  </p:cSld>
+  <p:clrMapOvr>
+    <a:masterClrMapping/>
+  </p:clrMapOvr>
+</p:sld>
+</file>
+
+<file path=ppt/slides/slide16.xml><?xml version="1.0" encoding="utf-8"?>
+<p:sld xmlns:a="http://schemas.openxmlformats.org/drawingml/2006/main" xmlns:r="http://schemas.openxmlformats.org/officeDocument/2006/relationships" xmlns:p="http://schemas.openxmlformats.org/presentationml/2006/main">
+  <p:cSld>
+    <p:spTree>
+      <p:nvGrpSpPr>
+        <p:cNvPr id="1" name=""/>
+        <p:cNvGrpSpPr/>
+        <p:nvPr/>
+      </p:nvGrpSpPr>
+      <p:grpSpPr>
+        <a:xfrm>
+          <a:off x="0" y="0"/>
+          <a:ext cx="0" cy="0"/>
+          <a:chOff x="0" y="0"/>
+          <a:chExt cx="0" cy="0"/>
+        </a:xfrm>
+      </p:grpSpPr>
+      <p:sp>
+        <p:nvSpPr>
+          <p:cNvPr id="2" name="Nadpis 1">
+            <a:extLst>
+              <a:ext uri="{FF2B5EF4-FFF2-40B4-BE49-F238E27FC236}">
+                <a16:creationId xmlns:a16="http://schemas.microsoft.com/office/drawing/2014/main" id="{CF77B9D5-D7F3-427F-8C53-7E83390C1970}"/>
+              </a:ext>
+            </a:extLst>
+          </p:cNvPr>
+          <p:cNvSpPr>
+            <a:spLocks noGrp="1"/>
+          </p:cNvSpPr>
+          <p:nvPr>
+            <p:ph type="title"/>
+          </p:nvPr>
+        </p:nvSpPr>
+        <p:spPr/>
+        <p:txBody>
+          <a:bodyPr/>
+          <a:lstStyle/>
+          <a:p>
+            <a:r>
+              <a:rPr lang="cs-CZ" dirty="0"/>
+              <a:t>Retrospektiva 2. sprintu</a:t>
+            </a:r>
+          </a:p>
+        </p:txBody>
+      </p:sp>
+      <p:sp>
+        <p:nvSpPr>
+          <p:cNvPr id="3" name="Zástupný obsah 2">
+            <a:extLst>
+              <a:ext uri="{FF2B5EF4-FFF2-40B4-BE49-F238E27FC236}">
+                <a16:creationId xmlns:a16="http://schemas.microsoft.com/office/drawing/2014/main" id="{F59BA096-C7DE-49A0-9292-83D9A68E17F5}"/>
+              </a:ext>
+            </a:extLst>
+          </p:cNvPr>
+          <p:cNvSpPr>
+            <a:spLocks noGrp="1"/>
+          </p:cNvSpPr>
+          <p:nvPr>
+            <p:ph idx="1"/>
+          </p:nvPr>
+        </p:nvSpPr>
+        <p:spPr/>
+        <p:txBody>
+          <a:bodyPr/>
+          <a:lstStyle/>
+          <a:p>
+            <a:r>
+              <a:rPr lang="cs-CZ" dirty="0"/>
+              <a:t>V čem pokračovat: Skype meeting a zachování jednoduchosti produktu</a:t>
+            </a:r>
+          </a:p>
+          <a:p>
+            <a:r>
+              <a:rPr lang="cs-CZ" dirty="0"/>
+              <a:t>S čím začít: S plánem na časovou tíseň</a:t>
+            </a:r>
+          </a:p>
+          <a:p>
+            <a:r>
+              <a:rPr lang="cs-CZ" dirty="0"/>
+              <a:t>Co posílit: Zohlednění </a:t>
+            </a:r>
+            <a:r>
+              <a:rPr lang="cs-CZ" dirty="0" err="1"/>
+              <a:t>DoD</a:t>
+            </a:r>
+            <a:r>
+              <a:rPr lang="cs-CZ" dirty="0"/>
+              <a:t> a </a:t>
+            </a:r>
+            <a:r>
+              <a:rPr lang="cs-CZ" dirty="0" err="1"/>
+              <a:t>DoR</a:t>
+            </a:r>
+            <a:endParaRPr lang="cs-CZ" dirty="0"/>
+          </a:p>
+          <a:p>
+            <a:r>
+              <a:rPr lang="cs-CZ" dirty="0"/>
+              <a:t>Co utlumit: Množství práce na krátký časový interval</a:t>
+            </a:r>
+          </a:p>
+          <a:p>
+            <a:endParaRPr lang="cs-CZ" dirty="0"/>
+          </a:p>
+          <a:p>
+            <a:r>
+              <a:rPr lang="cs-CZ" dirty="0"/>
+              <a:t>Co se nepovedlo: 4 </a:t>
+            </a:r>
+            <a:r>
+              <a:rPr lang="cs-CZ" dirty="0" err="1"/>
+              <a:t>zabugované</a:t>
+            </a:r>
+            <a:r>
+              <a:rPr lang="cs-CZ" dirty="0"/>
+              <a:t> US – stav recenzního posudku, přijetí článku, přijetí změn a změna stavu článku</a:t>
+            </a:r>
+          </a:p>
+          <a:p>
+            <a:endParaRPr lang="cs-CZ" dirty="0"/>
+          </a:p>
+        </p:txBody>
+      </p:sp>
+    </p:spTree>
+    <p:extLst>
+      <p:ext uri="{BB962C8B-B14F-4D97-AF65-F5344CB8AC3E}">
+        <p14:creationId xmlns:p14="http://schemas.microsoft.com/office/powerpoint/2010/main" val="3923260788"/>
+      </p:ext>
+    </p:extLst>
+  </p:cSld>
+  <p:clrMapOvr>
+    <a:masterClrMapping/>
+  </p:clrMapOvr>
+</p:sld>
+</file>
+
+<file path=ppt/slides/slide17.xml><?xml version="1.0" encoding="utf-8"?>
+<p:sld xmlns:a="http://schemas.openxmlformats.org/drawingml/2006/main" xmlns:r="http://schemas.openxmlformats.org/officeDocument/2006/relationships" xmlns:p="http://schemas.openxmlformats.org/presentationml/2006/main">
+  <p:cSld>
+    <p:spTree>
+      <p:nvGrpSpPr>
+        <p:cNvPr id="1" name=""/>
+        <p:cNvGrpSpPr/>
+        <p:nvPr/>
+      </p:nvGrpSpPr>
+      <p:grpSpPr>
+        <a:xfrm>
+          <a:off x="0" y="0"/>
+          <a:ext cx="0" cy="0"/>
+          <a:chOff x="0" y="0"/>
+          <a:chExt cx="0" cy="0"/>
+        </a:xfrm>
+      </p:grpSpPr>
+      <p:sp>
+        <p:nvSpPr>
+          <p:cNvPr id="2" name="Nadpis 1">
+            <a:extLst>
+              <a:ext uri="{FF2B5EF4-FFF2-40B4-BE49-F238E27FC236}">
+                <a16:creationId xmlns:a16="http://schemas.microsoft.com/office/drawing/2014/main" id="{8BCDFA60-18B2-462B-A776-B8B33BCEE078}"/>
+              </a:ext>
+            </a:extLst>
+          </p:cNvPr>
+          <p:cNvSpPr>
+            <a:spLocks noGrp="1"/>
+          </p:cNvSpPr>
+          <p:nvPr>
+            <p:ph type="title"/>
+          </p:nvPr>
+        </p:nvSpPr>
+        <p:spPr/>
+        <p:txBody>
+          <a:bodyPr/>
+          <a:lstStyle/>
+          <a:p>
+            <a:r>
+              <a:rPr lang="cs-CZ" dirty="0" err="1"/>
+              <a:t>Review</a:t>
+            </a:r>
+            <a:r>
+              <a:rPr lang="cs-CZ" dirty="0"/>
+              <a:t> sprintu 2</a:t>
+            </a:r>
+          </a:p>
+        </p:txBody>
+      </p:sp>
+      <p:pic>
+        <p:nvPicPr>
+          <p:cNvPr id="4" name="Zástupný obsah 3">
+            <a:extLst>
+              <a:ext uri="{FF2B5EF4-FFF2-40B4-BE49-F238E27FC236}">
+                <a16:creationId xmlns:a16="http://schemas.microsoft.com/office/drawing/2014/main" id="{5CA0F892-9D31-47C4-8DE1-D7E6E28A4D6E}"/>
+              </a:ext>
+            </a:extLst>
+          </p:cNvPr>
+          <p:cNvPicPr>
+            <a:picLocks noGrp="1" noChangeAspect="1"/>
+          </p:cNvPicPr>
+          <p:nvPr>
+            <p:ph idx="1"/>
+          </p:nvPr>
+        </p:nvPicPr>
+        <p:blipFill>
+          <a:blip r:embed="rId2"/>
+          <a:stretch>
+            <a:fillRect/>
+          </a:stretch>
+        </p:blipFill>
+        <p:spPr>
+          <a:xfrm>
+            <a:off x="5062590" y="2020466"/>
+            <a:ext cx="6637675" cy="1656184"/>
+          </a:xfrm>
+          <a:prstGeom prst="rect">
+            <a:avLst/>
+          </a:prstGeom>
+        </p:spPr>
+      </p:pic>
+      <p:pic>
+        <p:nvPicPr>
+          <p:cNvPr id="5" name="Obrázek 4">
+            <a:extLst>
+              <a:ext uri="{FF2B5EF4-FFF2-40B4-BE49-F238E27FC236}">
+                <a16:creationId xmlns:a16="http://schemas.microsoft.com/office/drawing/2014/main" id="{29627D64-90BB-447D-9427-5ABE0CF69525}"/>
+              </a:ext>
+            </a:extLst>
+          </p:cNvPr>
+          <p:cNvPicPr>
+            <a:picLocks noChangeAspect="1"/>
+          </p:cNvPicPr>
+          <p:nvPr/>
+        </p:nvPicPr>
+        <p:blipFill>
+          <a:blip r:embed="rId3"/>
+          <a:stretch>
+            <a:fillRect/>
+          </a:stretch>
+        </p:blipFill>
+        <p:spPr>
+          <a:xfrm>
+            <a:off x="5062590" y="3677816"/>
+            <a:ext cx="2672488" cy="681222"/>
+          </a:xfrm>
+          <a:prstGeom prst="rect">
+            <a:avLst/>
+          </a:prstGeom>
+        </p:spPr>
+      </p:pic>
+    </p:spTree>
+    <p:extLst>
+      <p:ext uri="{BB962C8B-B14F-4D97-AF65-F5344CB8AC3E}">
+        <p14:creationId xmlns:p14="http://schemas.microsoft.com/office/powerpoint/2010/main" val="3882058279"/>
       </p:ext>
     </p:extLst>
   </p:cSld>

</xml_diff>